<commit_message>
add stuff to readme
</commit_message>
<xml_diff>
--- a/doc/SAM-Trading.pptx
+++ b/doc/SAM-Trading.pptx
@@ -5,7 +5,7 @@
     <p:sldMasterId id="2147483648" r:id="rId1"/>
   </p:sldMasterIdLst>
   <p:notesMasterIdLst>
-    <p:notesMasterId r:id="rId15"/>
+    <p:notesMasterId r:id="rId13"/>
   </p:notesMasterIdLst>
   <p:sldIdLst>
     <p:sldId id="256" r:id="rId2"/>
@@ -15,12 +15,10 @@
     <p:sldId id="262" r:id="rId6"/>
     <p:sldId id="263" r:id="rId7"/>
     <p:sldId id="264" r:id="rId8"/>
-    <p:sldId id="265" r:id="rId9"/>
-    <p:sldId id="266" r:id="rId10"/>
-    <p:sldId id="268" r:id="rId11"/>
-    <p:sldId id="267" r:id="rId12"/>
-    <p:sldId id="269" r:id="rId13"/>
-    <p:sldId id="270" r:id="rId14"/>
+    <p:sldId id="273" r:id="rId9"/>
+    <p:sldId id="272" r:id="rId10"/>
+    <p:sldId id="271" r:id="rId11"/>
+    <p:sldId id="274" r:id="rId12"/>
   </p:sldIdLst>
   <p:sldSz cx="9144000" cy="6858000" type="screen4x3"/>
   <p:notesSz cx="6858000" cy="9144000"/>
@@ -379,7 +377,7 @@
               <a14:shadowObscured xmlns:a14="http://schemas.microsoft.com/office/drawing/2010/main" val="1"/>
             </a:ext>
             <a:ext uri="{FAA26D3D-D897-4be2-8F04-BA451C77F1D7}">
-              <ma14:placeholderFlag xmlns:ma14="http://schemas.microsoft.com/office/mac/drawingml/2011/main" val="1"/>
+              <ma14:placeholderFlag xmlns:ma14="http://schemas.microsoft.com/office/mac/drawingml/2011/main" xmlns="" val="1"/>
             </a:ext>
           </a:extLst>
         </p:spPr>
@@ -1888,7 +1886,7 @@
               </a14:hiddenEffects>
             </a:ext>
             <a:ext uri="{FAA26D3D-D897-4be2-8F04-BA451C77F1D7}">
-              <ma14:placeholderFlag xmlns:ma14="http://schemas.microsoft.com/office/mac/drawingml/2011/main" val="1"/>
+              <ma14:placeholderFlag xmlns:ma14="http://schemas.microsoft.com/office/mac/drawingml/2011/main" xmlns="" val="1"/>
             </a:ext>
           </a:extLst>
         </p:spPr>
@@ -1961,7 +1959,7 @@
               </a14:hiddenEffects>
             </a:ext>
             <a:ext uri="{FAA26D3D-D897-4be2-8F04-BA451C77F1D7}">
-              <ma14:placeholderFlag xmlns:ma14="http://schemas.microsoft.com/office/mac/drawingml/2011/main" val="1"/>
+              <ma14:placeholderFlag xmlns:ma14="http://schemas.microsoft.com/office/mac/drawingml/2011/main" xmlns="" val="1"/>
             </a:ext>
           </a:extLst>
         </p:spPr>
@@ -2756,9 +2754,58 @@
           <a:p>
             <a:r>
               <a:rPr lang="de-DE" dirty="0" smtClean="0"/>
-              <a:t>Persistenz - Customer</a:t>
+              <a:t>Welche Probleme es zu lösen gab</a:t>
             </a:r>
             <a:endParaRPr lang="de-DE" dirty="0"/>
+          </a:p>
+        </p:txBody>
+      </p:sp>
+      <p:sp>
+        <p:nvSpPr>
+          <p:cNvPr id="3" name="Inhaltsplatzhalter 2"/>
+          <p:cNvSpPr>
+            <a:spLocks noGrp="1"/>
+          </p:cNvSpPr>
+          <p:nvPr>
+            <p:ph idx="1"/>
+          </p:nvPr>
+        </p:nvSpPr>
+        <p:spPr/>
+        <p:txBody>
+          <a:bodyPr/>
+          <a:lstStyle/>
+          <a:p>
+            <a:r>
+              <a:rPr lang="de-DE" dirty="0" err="1" smtClean="0"/>
+              <a:t>Wildfly</a:t>
+            </a:r>
+            <a:r>
+              <a:rPr lang="de-DE" dirty="0" smtClean="0"/>
+              <a:t> in Version 9.0.1 zum Teil instabil</a:t>
+            </a:r>
+          </a:p>
+          <a:p>
+            <a:pPr lvl="1"/>
+            <a:r>
+              <a:rPr lang="de-DE" dirty="0" smtClean="0"/>
+              <a:t>Lösung: „damit leben“ ;-)</a:t>
+            </a:r>
+          </a:p>
+          <a:p>
+            <a:r>
+              <a:rPr lang="de-DE" dirty="0" smtClean="0"/>
+              <a:t>Cross-Origin-Resource-Sharing (UI -&gt; Service)</a:t>
+            </a:r>
+          </a:p>
+          <a:p>
+            <a:pPr lvl="1"/>
+            <a:r>
+              <a:rPr lang="de-DE" dirty="0" smtClean="0"/>
+              <a:t>Lösung: Browser-Add-On (aus Zeitgründen)</a:t>
+            </a:r>
+          </a:p>
+          <a:p>
+            <a:endParaRPr lang="de-DE" dirty="0" smtClean="0"/>
           </a:p>
         </p:txBody>
       </p:sp>
@@ -2829,81 +2876,16 @@
           </a:p>
         </p:txBody>
       </p:sp>
-      <p:pic>
-        <p:nvPicPr>
-          <p:cNvPr id="7" name="Grafik 6"/>
-          <p:cNvPicPr>
-            <a:picLocks noChangeAspect="1"/>
-          </p:cNvPicPr>
-          <p:nvPr/>
-        </p:nvPicPr>
-        <p:blipFill>
-          <a:blip r:embed="rId2"/>
-          <a:stretch>
-            <a:fillRect/>
-          </a:stretch>
-        </p:blipFill>
-        <p:spPr>
-          <a:xfrm>
-            <a:off x="611187" y="1700808"/>
-            <a:ext cx="3570681" cy="1584175"/>
-          </a:xfrm>
-          <a:prstGeom prst="rect">
-            <a:avLst/>
-          </a:prstGeom>
-          <a:ln>
-            <a:solidFill>
-              <a:schemeClr val="tx1"/>
-            </a:solidFill>
-          </a:ln>
-        </p:spPr>
-      </p:pic>
-      <p:pic>
-        <p:nvPicPr>
-          <p:cNvPr id="11" name="Grafik 10"/>
-          <p:cNvPicPr>
-            <a:picLocks noChangeAspect="1"/>
-          </p:cNvPicPr>
-          <p:nvPr/>
-        </p:nvPicPr>
-        <p:blipFill>
-          <a:blip r:embed="rId3"/>
-          <a:stretch>
-            <a:fillRect/>
-          </a:stretch>
-        </p:blipFill>
-        <p:spPr>
-          <a:xfrm>
-            <a:off x="642281" y="3671491"/>
-            <a:ext cx="4073735" cy="2504699"/>
-          </a:xfrm>
-          <a:prstGeom prst="rect">
-            <a:avLst/>
-          </a:prstGeom>
-          <a:ln>
-            <a:solidFill>
-              <a:schemeClr val="tx1"/>
-            </a:solidFill>
-          </a:ln>
-        </p:spPr>
-      </p:pic>
     </p:spTree>
     <p:extLst>
       <p:ext uri="{BB962C8B-B14F-4D97-AF65-F5344CB8AC3E}">
-        <p14:creationId xmlns:p14="http://schemas.microsoft.com/office/powerpoint/2010/main" val="3507132927"/>
+        <p14:creationId xmlns:p14="http://schemas.microsoft.com/office/powerpoint/2010/main" val="2290566669"/>
       </p:ext>
     </p:extLst>
   </p:cSld>
   <p:clrMapOvr>
     <a:masterClrMapping/>
   </p:clrMapOvr>
-  <p:timing>
-    <p:tnLst>
-      <p:par>
-        <p:cTn id="1" dur="indefinite" restart="never" nodeType="tmRoot"/>
-      </p:par>
-    </p:tnLst>
-  </p:timing>
 </p:sld>
 </file>
 
@@ -2941,7 +2923,78 @@
           <a:p>
             <a:r>
               <a:rPr lang="de-DE" dirty="0" smtClean="0"/>
-              <a:t>Persistenz - Company</a:t>
+              <a:t>Verbesserungsmöglichkeiten</a:t>
+            </a:r>
+            <a:endParaRPr lang="de-DE" dirty="0"/>
+          </a:p>
+        </p:txBody>
+      </p:sp>
+      <p:sp>
+        <p:nvSpPr>
+          <p:cNvPr id="3" name="Inhaltsplatzhalter 2"/>
+          <p:cNvSpPr>
+            <a:spLocks noGrp="1"/>
+          </p:cNvSpPr>
+          <p:nvPr>
+            <p:ph idx="1"/>
+          </p:nvPr>
+        </p:nvSpPr>
+        <p:spPr>
+          <a:xfrm>
+            <a:off x="589557" y="1757113"/>
+            <a:ext cx="7848600" cy="4175125"/>
+          </a:xfrm>
+        </p:spPr>
+        <p:txBody>
+          <a:bodyPr/>
+          <a:lstStyle/>
+          <a:p>
+            <a:r>
+              <a:rPr lang="de-DE" dirty="0" smtClean="0"/>
+              <a:t>Platzierung von Käufen und Verkäufen mittels Kurs-Range</a:t>
+            </a:r>
+          </a:p>
+          <a:p>
+            <a:pPr lvl="1"/>
+            <a:r>
+              <a:rPr lang="de-DE" dirty="0" smtClean="0"/>
+              <a:t>möglich durch lose Kopplung der Systeme</a:t>
+            </a:r>
+          </a:p>
+          <a:p>
+            <a:pPr lvl="1"/>
+            <a:endParaRPr lang="de-DE" dirty="0" smtClean="0"/>
+          </a:p>
+          <a:p>
+            <a:r>
+              <a:rPr lang="de-DE" dirty="0" smtClean="0"/>
+              <a:t>optisch ansprechendere UI</a:t>
+            </a:r>
+          </a:p>
+          <a:p>
+            <a:pPr lvl="1"/>
+            <a:r>
+              <a:rPr lang="de-DE" dirty="0" smtClean="0"/>
+              <a:t>Mehrere Filtermöglichkeiten, Sortierungen, etc. Benutzergesteuerten Update der Kurse</a:t>
+            </a:r>
+          </a:p>
+          <a:p>
+            <a:pPr lvl="1"/>
+            <a:endParaRPr lang="de-DE" dirty="0"/>
+          </a:p>
+          <a:p>
+            <a:r>
+              <a:rPr lang="de-DE" dirty="0" smtClean="0"/>
+              <a:t>Benutzer die Möglichkeit geben per Knopfdruck aktuelle Kurse von der Börse zu laden</a:t>
+            </a:r>
+          </a:p>
+          <a:p>
+            <a:endParaRPr lang="de-DE" dirty="0"/>
+          </a:p>
+          <a:p>
+            <a:r>
+              <a:rPr lang="de-DE" dirty="0" smtClean="0"/>
+              <a:t>Benutzer wird zB per Websocket über Änderung von Status eines Requests informiert</a:t>
             </a:r>
             <a:endParaRPr lang="de-DE" dirty="0"/>
           </a:p>
@@ -3014,393 +3067,16 @@
           </a:p>
         </p:txBody>
       </p:sp>
-      <p:pic>
-        <p:nvPicPr>
-          <p:cNvPr id="3" name="Grafik 2"/>
-          <p:cNvPicPr>
-            <a:picLocks noChangeAspect="1"/>
-          </p:cNvPicPr>
-          <p:nvPr/>
-        </p:nvPicPr>
-        <p:blipFill>
-          <a:blip r:embed="rId2"/>
-          <a:stretch>
-            <a:fillRect/>
-          </a:stretch>
-        </p:blipFill>
-        <p:spPr>
-          <a:xfrm>
-            <a:off x="628359" y="1644471"/>
-            <a:ext cx="3655609" cy="1715076"/>
-          </a:xfrm>
-          <a:prstGeom prst="rect">
-            <a:avLst/>
-          </a:prstGeom>
-          <a:ln>
-            <a:solidFill>
-              <a:schemeClr val="tx1"/>
-            </a:solidFill>
-          </a:ln>
-        </p:spPr>
-      </p:pic>
-      <p:pic>
-        <p:nvPicPr>
-          <p:cNvPr id="11" name="Grafik 10"/>
-          <p:cNvPicPr>
-            <a:picLocks noChangeAspect="1"/>
-          </p:cNvPicPr>
-          <p:nvPr/>
-        </p:nvPicPr>
-        <p:blipFill>
-          <a:blip r:embed="rId3"/>
-          <a:stretch>
-            <a:fillRect/>
-          </a:stretch>
-        </p:blipFill>
-        <p:spPr>
-          <a:xfrm>
-            <a:off x="611188" y="3472475"/>
-            <a:ext cx="5314950" cy="3352800"/>
-          </a:xfrm>
-          <a:prstGeom prst="rect">
-            <a:avLst/>
-          </a:prstGeom>
-          <a:ln>
-            <a:solidFill>
-              <a:schemeClr val="tx1"/>
-            </a:solidFill>
-          </a:ln>
-        </p:spPr>
-      </p:pic>
     </p:spTree>
     <p:extLst>
       <p:ext uri="{BB962C8B-B14F-4D97-AF65-F5344CB8AC3E}">
-        <p14:creationId xmlns:p14="http://schemas.microsoft.com/office/powerpoint/2010/main" val="3016821506"/>
+        <p14:creationId xmlns:p14="http://schemas.microsoft.com/office/powerpoint/2010/main" val="1303363360"/>
       </p:ext>
     </p:extLst>
   </p:cSld>
   <p:clrMapOvr>
     <a:masterClrMapping/>
   </p:clrMapOvr>
-  <p:timing>
-    <p:tnLst>
-      <p:par>
-        <p:cTn id="1" dur="indefinite" restart="never" nodeType="tmRoot"/>
-      </p:par>
-    </p:tnLst>
-  </p:timing>
-</p:sld>
-</file>
-
-<file path=ppt/slides/slide12.xml><?xml version="1.0" encoding="utf-8"?>
-<p:sld xmlns:a="http://schemas.openxmlformats.org/drawingml/2006/main" xmlns:r="http://schemas.openxmlformats.org/officeDocument/2006/relationships" xmlns:p="http://schemas.openxmlformats.org/presentationml/2006/main">
-  <p:cSld>
-    <p:spTree>
-      <p:nvGrpSpPr>
-        <p:cNvPr id="1" name=""/>
-        <p:cNvGrpSpPr/>
-        <p:nvPr/>
-      </p:nvGrpSpPr>
-      <p:grpSpPr>
-        <a:xfrm>
-          <a:off x="0" y="0"/>
-          <a:ext cx="0" cy="0"/>
-          <a:chOff x="0" y="0"/>
-          <a:chExt cx="0" cy="0"/>
-        </a:xfrm>
-      </p:grpSpPr>
-      <p:sp>
-        <p:nvSpPr>
-          <p:cNvPr id="2" name="Titel 1"/>
-          <p:cNvSpPr>
-            <a:spLocks noGrp="1"/>
-          </p:cNvSpPr>
-          <p:nvPr>
-            <p:ph type="title"/>
-          </p:nvPr>
-        </p:nvSpPr>
-        <p:spPr/>
-        <p:txBody>
-          <a:bodyPr/>
-          <a:lstStyle/>
-          <a:p>
-            <a:r>
-              <a:rPr lang="de-DE" dirty="0" smtClean="0"/>
-              <a:t>Persistenz – Transaction I</a:t>
-            </a:r>
-            <a:endParaRPr lang="de-DE" dirty="0"/>
-          </a:p>
-        </p:txBody>
-      </p:sp>
-      <p:sp>
-        <p:nvSpPr>
-          <p:cNvPr id="4" name="Foliennummernplatzhalter 3"/>
-          <p:cNvSpPr>
-            <a:spLocks noGrp="1"/>
-          </p:cNvSpPr>
-          <p:nvPr>
-            <p:ph type="sldNum" sz="quarter" idx="10"/>
-          </p:nvPr>
-        </p:nvSpPr>
-        <p:spPr/>
-        <p:txBody>
-          <a:bodyPr/>
-          <a:lstStyle/>
-          <a:p>
-            <a:endParaRPr lang="de-AT" altLang="de-DE" smtClean="0"/>
-          </a:p>
-          <a:p>
-            <a:fld id="{7EC4E6D6-A719-DF47-A733-082DDAE7ED71}" type="slidenum">
-              <a:rPr lang="de-AT" altLang="de-DE" sz="800" smtClean="0">
-                <a:solidFill>
-                  <a:srgbClr val="626B71"/>
-                </a:solidFill>
-              </a:rPr>
-              <a:pPr/>
-              <a:t>12</a:t>
-            </a:fld>
-            <a:endParaRPr lang="de-AT" altLang="de-DE" sz="800">
-              <a:solidFill>
-                <a:srgbClr val="626B71"/>
-              </a:solidFill>
-            </a:endParaRPr>
-          </a:p>
-        </p:txBody>
-      </p:sp>
-      <p:sp>
-        <p:nvSpPr>
-          <p:cNvPr id="5" name="Fußzeilenplatzhalter 4"/>
-          <p:cNvSpPr>
-            <a:spLocks noGrp="1"/>
-          </p:cNvSpPr>
-          <p:nvPr>
-            <p:ph type="ftr" sz="quarter" idx="11"/>
-          </p:nvPr>
-        </p:nvSpPr>
-        <p:spPr/>
-        <p:txBody>
-          <a:bodyPr/>
-          <a:lstStyle/>
-          <a:p>
-            <a:pPr>
-              <a:defRPr/>
-            </a:pPr>
-            <a:endParaRPr lang="de-AT" smtClean="0"/>
-          </a:p>
-          <a:p>
-            <a:pPr>
-              <a:defRPr/>
-            </a:pPr>
-            <a:r>
-              <a:rPr lang="de-AT" smtClean="0"/>
-              <a:t>© FH Technikum Wien</a:t>
-            </a:r>
-            <a:endParaRPr lang="de-AT"/>
-          </a:p>
-        </p:txBody>
-      </p:sp>
-      <p:pic>
-        <p:nvPicPr>
-          <p:cNvPr id="3" name="Grafik 2"/>
-          <p:cNvPicPr>
-            <a:picLocks noChangeAspect="1"/>
-          </p:cNvPicPr>
-          <p:nvPr/>
-        </p:nvPicPr>
-        <p:blipFill>
-          <a:blip r:embed="rId2"/>
-          <a:stretch>
-            <a:fillRect/>
-          </a:stretch>
-        </p:blipFill>
-        <p:spPr>
-          <a:xfrm>
-            <a:off x="683568" y="1772816"/>
-            <a:ext cx="4438650" cy="2609850"/>
-          </a:xfrm>
-          <a:prstGeom prst="rect">
-            <a:avLst/>
-          </a:prstGeom>
-          <a:ln>
-            <a:solidFill>
-              <a:schemeClr val="tx1"/>
-            </a:solidFill>
-          </a:ln>
-        </p:spPr>
-      </p:pic>
-    </p:spTree>
-    <p:extLst>
-      <p:ext uri="{BB962C8B-B14F-4D97-AF65-F5344CB8AC3E}">
-        <p14:creationId xmlns:p14="http://schemas.microsoft.com/office/powerpoint/2010/main" val="2752126305"/>
-      </p:ext>
-    </p:extLst>
-  </p:cSld>
-  <p:clrMapOvr>
-    <a:masterClrMapping/>
-  </p:clrMapOvr>
-  <p:timing>
-    <p:tnLst>
-      <p:par>
-        <p:cTn id="1" dur="indefinite" restart="never" nodeType="tmRoot"/>
-      </p:par>
-    </p:tnLst>
-  </p:timing>
-</p:sld>
-</file>
-
-<file path=ppt/slides/slide13.xml><?xml version="1.0" encoding="utf-8"?>
-<p:sld xmlns:a="http://schemas.openxmlformats.org/drawingml/2006/main" xmlns:r="http://schemas.openxmlformats.org/officeDocument/2006/relationships" xmlns:p="http://schemas.openxmlformats.org/presentationml/2006/main">
-  <p:cSld>
-    <p:spTree>
-      <p:nvGrpSpPr>
-        <p:cNvPr id="1" name=""/>
-        <p:cNvGrpSpPr/>
-        <p:nvPr/>
-      </p:nvGrpSpPr>
-      <p:grpSpPr>
-        <a:xfrm>
-          <a:off x="0" y="0"/>
-          <a:ext cx="0" cy="0"/>
-          <a:chOff x="0" y="0"/>
-          <a:chExt cx="0" cy="0"/>
-        </a:xfrm>
-      </p:grpSpPr>
-      <p:sp>
-        <p:nvSpPr>
-          <p:cNvPr id="2" name="Titel 1"/>
-          <p:cNvSpPr>
-            <a:spLocks noGrp="1"/>
-          </p:cNvSpPr>
-          <p:nvPr>
-            <p:ph type="title"/>
-          </p:nvPr>
-        </p:nvSpPr>
-        <p:spPr/>
-        <p:txBody>
-          <a:bodyPr/>
-          <a:lstStyle/>
-          <a:p>
-            <a:r>
-              <a:rPr lang="de-DE" dirty="0" smtClean="0"/>
-              <a:t>Persistenz – Transaction II</a:t>
-            </a:r>
-            <a:endParaRPr lang="de-DE" dirty="0"/>
-          </a:p>
-        </p:txBody>
-      </p:sp>
-      <p:sp>
-        <p:nvSpPr>
-          <p:cNvPr id="4" name="Foliennummernplatzhalter 3"/>
-          <p:cNvSpPr>
-            <a:spLocks noGrp="1"/>
-          </p:cNvSpPr>
-          <p:nvPr>
-            <p:ph type="sldNum" sz="quarter" idx="10"/>
-          </p:nvPr>
-        </p:nvSpPr>
-        <p:spPr/>
-        <p:txBody>
-          <a:bodyPr/>
-          <a:lstStyle/>
-          <a:p>
-            <a:endParaRPr lang="de-AT" altLang="de-DE" smtClean="0"/>
-          </a:p>
-          <a:p>
-            <a:fld id="{7EC4E6D6-A719-DF47-A733-082DDAE7ED71}" type="slidenum">
-              <a:rPr lang="de-AT" altLang="de-DE" sz="800" smtClean="0">
-                <a:solidFill>
-                  <a:srgbClr val="626B71"/>
-                </a:solidFill>
-              </a:rPr>
-              <a:pPr/>
-              <a:t>13</a:t>
-            </a:fld>
-            <a:endParaRPr lang="de-AT" altLang="de-DE" sz="800">
-              <a:solidFill>
-                <a:srgbClr val="626B71"/>
-              </a:solidFill>
-            </a:endParaRPr>
-          </a:p>
-        </p:txBody>
-      </p:sp>
-      <p:sp>
-        <p:nvSpPr>
-          <p:cNvPr id="5" name="Fußzeilenplatzhalter 4"/>
-          <p:cNvSpPr>
-            <a:spLocks noGrp="1"/>
-          </p:cNvSpPr>
-          <p:nvPr>
-            <p:ph type="ftr" sz="quarter" idx="11"/>
-          </p:nvPr>
-        </p:nvSpPr>
-        <p:spPr/>
-        <p:txBody>
-          <a:bodyPr/>
-          <a:lstStyle/>
-          <a:p>
-            <a:pPr>
-              <a:defRPr/>
-            </a:pPr>
-            <a:endParaRPr lang="de-AT" smtClean="0"/>
-          </a:p>
-          <a:p>
-            <a:pPr>
-              <a:defRPr/>
-            </a:pPr>
-            <a:r>
-              <a:rPr lang="de-AT" smtClean="0"/>
-              <a:t>© FH Technikum Wien</a:t>
-            </a:r>
-            <a:endParaRPr lang="de-AT"/>
-          </a:p>
-        </p:txBody>
-      </p:sp>
-      <p:pic>
-        <p:nvPicPr>
-          <p:cNvPr id="7" name="Grafik 6"/>
-          <p:cNvPicPr>
-            <a:picLocks noChangeAspect="1"/>
-          </p:cNvPicPr>
-          <p:nvPr/>
-        </p:nvPicPr>
-        <p:blipFill>
-          <a:blip r:embed="rId2"/>
-          <a:stretch>
-            <a:fillRect/>
-          </a:stretch>
-        </p:blipFill>
-        <p:spPr>
-          <a:xfrm>
-            <a:off x="655141" y="1628800"/>
-            <a:ext cx="6753225" cy="3752850"/>
-          </a:xfrm>
-          <a:prstGeom prst="rect">
-            <a:avLst/>
-          </a:prstGeom>
-          <a:ln>
-            <a:solidFill>
-              <a:schemeClr val="tx1"/>
-            </a:solidFill>
-          </a:ln>
-        </p:spPr>
-      </p:pic>
-    </p:spTree>
-    <p:extLst>
-      <p:ext uri="{BB962C8B-B14F-4D97-AF65-F5344CB8AC3E}">
-        <p14:creationId xmlns:p14="http://schemas.microsoft.com/office/powerpoint/2010/main" val="1956113036"/>
-      </p:ext>
-    </p:extLst>
-  </p:cSld>
-  <p:clrMapOvr>
-    <a:masterClrMapping/>
-  </p:clrMapOvr>
-  <p:timing>
-    <p:tnLst>
-      <p:par>
-        <p:cTn id="1" dur="indefinite" restart="never" nodeType="tmRoot"/>
-      </p:par>
-    </p:tnLst>
-  </p:timing>
 </p:sld>
 </file>
 
@@ -3477,11 +3153,7 @@
           <a:p>
             <a:r>
               <a:rPr lang="de-DE" dirty="0" smtClean="0"/>
-              <a:t>Verwaltung der Kunden durch </a:t>
-            </a:r>
-            <a:r>
-              <a:rPr lang="de-DE" dirty="0" smtClean="0"/>
-              <a:t>Mitarbeiter</a:t>
+              <a:t>Verwaltung der Kunden durch Mitarbeiter</a:t>
             </a:r>
           </a:p>
           <a:p>
@@ -4598,14 +4270,19 @@
             <p:ph type="title"/>
           </p:nvPr>
         </p:nvSpPr>
-        <p:spPr/>
+        <p:spPr>
+          <a:xfrm>
+            <a:off x="539068" y="2397919"/>
+            <a:ext cx="6841132" cy="622300"/>
+          </a:xfrm>
+        </p:spPr>
         <p:txBody>
           <a:bodyPr/>
           <a:lstStyle/>
           <a:p>
             <a:r>
               <a:rPr lang="de-DE" dirty="0" smtClean="0"/>
-              <a:t>Persistenz</a:t>
+              <a:t>Das war der Plan..</a:t>
             </a:r>
             <a:endParaRPr lang="de-DE" dirty="0"/>
           </a:p>
@@ -4626,7 +4303,7 @@
           <a:bodyPr/>
           <a:lstStyle/>
           <a:p>
-            <a:endParaRPr lang="de-AT" altLang="de-DE" smtClean="0"/>
+            <a:endParaRPr lang="de-AT" altLang="de-DE" dirty="0" smtClean="0"/>
           </a:p>
           <a:p>
             <a:fld id="{7EC4E6D6-A719-DF47-A733-082DDAE7ED71}" type="slidenum">
@@ -4638,7 +4315,7 @@
               <a:pPr/>
               <a:t>8</a:t>
             </a:fld>
-            <a:endParaRPr lang="de-AT" altLang="de-DE" sz="800">
+            <a:endParaRPr lang="de-AT" altLang="de-DE" sz="800" dirty="0">
               <a:solidFill>
                 <a:srgbClr val="626B71"/>
               </a:solidFill>
@@ -4678,47 +4355,229 @@
           </a:p>
         </p:txBody>
       </p:sp>
-      <p:pic>
-        <p:nvPicPr>
-          <p:cNvPr id="7" name="Grafik 6"/>
-          <p:cNvPicPr>
-            <a:picLocks noChangeAspect="1"/>
-          </p:cNvPicPr>
+      <p:sp>
+        <p:nvSpPr>
+          <p:cNvPr id="8" name="Rectangle 17"/>
+          <p:cNvSpPr txBox="1">
+            <a:spLocks noChangeArrowheads="1"/>
+          </p:cNvSpPr>
           <p:nvPr/>
-        </p:nvPicPr>
-        <p:blipFill>
-          <a:blip r:embed="rId2"/>
-          <a:stretch>
-            <a:fillRect/>
-          </a:stretch>
-        </p:blipFill>
-        <p:spPr>
+        </p:nvSpPr>
+        <p:spPr bwMode="auto">
           <a:xfrm>
-            <a:off x="611188" y="1700808"/>
-            <a:ext cx="8137276" cy="4410860"/>
+            <a:off x="890588" y="3861048"/>
+            <a:ext cx="7543800" cy="863600"/>
           </a:xfrm>
           <a:prstGeom prst="rect">
             <a:avLst/>
           </a:prstGeom>
+          <a:noFill/>
+          <a:ln>
+            <a:noFill/>
+          </a:ln>
+          <a:effectLst/>
+          <a:extLst>
+            <a:ext uri="{909E8E84-426E-40DD-AFC4-6F175D3DCCD1}">
+              <a14:hiddenFill xmlns:a14="http://schemas.microsoft.com/office/drawing/2010/main">
+                <a:solidFill>
+                  <a:schemeClr val="accent1"/>
+                </a:solidFill>
+              </a14:hiddenFill>
+            </a:ext>
+            <a:ext uri="{91240B29-F687-4F45-9708-019B960494DF}">
+              <a14:hiddenLine xmlns:a14="http://schemas.microsoft.com/office/drawing/2010/main" w="9525">
+                <a:solidFill>
+                  <a:schemeClr val="tx1"/>
+                </a:solidFill>
+                <a:miter lim="800000"/>
+                <a:headEnd/>
+                <a:tailEnd/>
+              </a14:hiddenLine>
+            </a:ext>
+            <a:ext uri="{AF507438-7753-43E0-B8FC-AC1667EBCBE1}">
+              <a14:hiddenEffects xmlns:a14="http://schemas.microsoft.com/office/drawing/2010/main">
+                <a:effectLst>
+                  <a:outerShdw blurRad="63500" dist="38099" dir="2700000" algn="ctr" rotWithShape="0">
+                    <a:schemeClr val="bg2">
+                      <a:alpha val="74998"/>
+                    </a:schemeClr>
+                  </a:outerShdw>
+                </a:effectLst>
+              </a14:hiddenEffects>
+            </a:ext>
+            <a:ext uri="{FAA26D3D-D897-4be2-8F04-BA451C77F1D7}">
+              <ma14:placeholderFlag xmlns:ma14="http://schemas.microsoft.com/office/mac/drawingml/2011/main" xmlns="" val="1"/>
+            </a:ext>
+          </a:extLst>
         </p:spPr>
-      </p:pic>
+        <p:txBody>
+          <a:bodyPr vert="horz" wrap="none" lIns="91440" tIns="45720" rIns="91440" bIns="45720" numCol="1" anchor="ctr" anchorCtr="0" compatLnSpc="1">
+            <a:prstTxWarp prst="textNoShape">
+              <a:avLst/>
+            </a:prstTxWarp>
+          </a:bodyPr>
+          <a:lstStyle>
+            <a:lvl1pPr algn="l" rtl="0" fontAlgn="base">
+              <a:spcBef>
+                <a:spcPct val="0"/>
+              </a:spcBef>
+              <a:spcAft>
+                <a:spcPct val="0"/>
+              </a:spcAft>
+              <a:defRPr sz="3200">
+                <a:solidFill>
+                  <a:schemeClr val="tx2"/>
+                </a:solidFill>
+                <a:latin typeface="+mj-lt"/>
+                <a:ea typeface="Arial" charset="0"/>
+                <a:cs typeface="+mj-cs"/>
+              </a:defRPr>
+            </a:lvl1pPr>
+            <a:lvl2pPr algn="l" rtl="0" fontAlgn="base">
+              <a:spcBef>
+                <a:spcPct val="0"/>
+              </a:spcBef>
+              <a:spcAft>
+                <a:spcPct val="0"/>
+              </a:spcAft>
+              <a:defRPr sz="3200">
+                <a:solidFill>
+                  <a:schemeClr val="tx2"/>
+                </a:solidFill>
+                <a:latin typeface="Arial" charset="0"/>
+                <a:ea typeface="Arial" charset="0"/>
+                <a:cs typeface="Arial" charset="0"/>
+              </a:defRPr>
+            </a:lvl2pPr>
+            <a:lvl3pPr algn="l" rtl="0" fontAlgn="base">
+              <a:spcBef>
+                <a:spcPct val="0"/>
+              </a:spcBef>
+              <a:spcAft>
+                <a:spcPct val="0"/>
+              </a:spcAft>
+              <a:defRPr sz="3200">
+                <a:solidFill>
+                  <a:schemeClr val="tx2"/>
+                </a:solidFill>
+                <a:latin typeface="Arial" charset="0"/>
+                <a:ea typeface="Arial" charset="0"/>
+                <a:cs typeface="Arial" charset="0"/>
+              </a:defRPr>
+            </a:lvl3pPr>
+            <a:lvl4pPr algn="l" rtl="0" fontAlgn="base">
+              <a:spcBef>
+                <a:spcPct val="0"/>
+              </a:spcBef>
+              <a:spcAft>
+                <a:spcPct val="0"/>
+              </a:spcAft>
+              <a:defRPr sz="3200">
+                <a:solidFill>
+                  <a:schemeClr val="tx2"/>
+                </a:solidFill>
+                <a:latin typeface="Arial" charset="0"/>
+                <a:ea typeface="Arial" charset="0"/>
+                <a:cs typeface="Arial" charset="0"/>
+              </a:defRPr>
+            </a:lvl4pPr>
+            <a:lvl5pPr algn="l" rtl="0" fontAlgn="base">
+              <a:spcBef>
+                <a:spcPct val="0"/>
+              </a:spcBef>
+              <a:spcAft>
+                <a:spcPct val="0"/>
+              </a:spcAft>
+              <a:defRPr sz="3200">
+                <a:solidFill>
+                  <a:schemeClr val="tx2"/>
+                </a:solidFill>
+                <a:latin typeface="Arial" charset="0"/>
+                <a:ea typeface="Arial" charset="0"/>
+                <a:cs typeface="Arial" charset="0"/>
+              </a:defRPr>
+            </a:lvl5pPr>
+            <a:lvl6pPr marL="457200" algn="l" rtl="0" eaLnBrk="1" fontAlgn="base" hangingPunct="1">
+              <a:spcBef>
+                <a:spcPct val="0"/>
+              </a:spcBef>
+              <a:spcAft>
+                <a:spcPct val="0"/>
+              </a:spcAft>
+              <a:defRPr sz="3200">
+                <a:solidFill>
+                  <a:schemeClr val="tx2"/>
+                </a:solidFill>
+                <a:latin typeface="Arial" charset="0"/>
+                <a:cs typeface="Arial" charset="0"/>
+              </a:defRPr>
+            </a:lvl6pPr>
+            <a:lvl7pPr marL="914400" algn="l" rtl="0" eaLnBrk="1" fontAlgn="base" hangingPunct="1">
+              <a:spcBef>
+                <a:spcPct val="0"/>
+              </a:spcBef>
+              <a:spcAft>
+                <a:spcPct val="0"/>
+              </a:spcAft>
+              <a:defRPr sz="3200">
+                <a:solidFill>
+                  <a:schemeClr val="tx2"/>
+                </a:solidFill>
+                <a:latin typeface="Arial" charset="0"/>
+                <a:cs typeface="Arial" charset="0"/>
+              </a:defRPr>
+            </a:lvl7pPr>
+            <a:lvl8pPr marL="1371600" algn="l" rtl="0" eaLnBrk="1" fontAlgn="base" hangingPunct="1">
+              <a:spcBef>
+                <a:spcPct val="0"/>
+              </a:spcBef>
+              <a:spcAft>
+                <a:spcPct val="0"/>
+              </a:spcAft>
+              <a:defRPr sz="3200">
+                <a:solidFill>
+                  <a:schemeClr val="tx2"/>
+                </a:solidFill>
+                <a:latin typeface="Arial" charset="0"/>
+                <a:cs typeface="Arial" charset="0"/>
+              </a:defRPr>
+            </a:lvl8pPr>
+            <a:lvl9pPr marL="1828800" algn="l" rtl="0" eaLnBrk="1" fontAlgn="base" hangingPunct="1">
+              <a:spcBef>
+                <a:spcPct val="0"/>
+              </a:spcBef>
+              <a:spcAft>
+                <a:spcPct val="0"/>
+              </a:spcAft>
+              <a:defRPr sz="3200">
+                <a:solidFill>
+                  <a:schemeClr val="tx2"/>
+                </a:solidFill>
+                <a:latin typeface="Arial" charset="0"/>
+                <a:cs typeface="Arial" charset="0"/>
+              </a:defRPr>
+            </a:lvl9pPr>
+          </a:lstStyle>
+          <a:p>
+            <a:pPr algn="r"/>
+            <a:r>
+              <a:rPr lang="de-DE" altLang="de-DE" kern="0" dirty="0" smtClean="0"/>
+              <a:t>.. und was kam wirklich heraus?</a:t>
+            </a:r>
+            <a:endParaRPr lang="de-DE" altLang="de-DE" kern="0" dirty="0"/>
+          </a:p>
+        </p:txBody>
+      </p:sp>
     </p:spTree>
     <p:extLst>
       <p:ext uri="{BB962C8B-B14F-4D97-AF65-F5344CB8AC3E}">
-        <p14:creationId xmlns:p14="http://schemas.microsoft.com/office/powerpoint/2010/main" val="3459960208"/>
+        <p14:creationId xmlns:p14="http://schemas.microsoft.com/office/powerpoint/2010/main" val="1223836490"/>
       </p:ext>
     </p:extLst>
   </p:cSld>
   <p:clrMapOvr>
     <a:masterClrMapping/>
   </p:clrMapOvr>
-  <p:timing>
-    <p:tnLst>
-      <p:par>
-        <p:cTn id="1" dur="indefinite" restart="never" nodeType="tmRoot"/>
-      </p:par>
-    </p:tnLst>
-  </p:timing>
 </p:sld>
 </file>
 
@@ -4756,7 +4615,35 @@
           <a:p>
             <a:r>
               <a:rPr lang="de-DE" dirty="0" smtClean="0"/>
-              <a:t>Persistenz - User</a:t>
+              <a:t>Abweichungen vom Plan</a:t>
+            </a:r>
+            <a:endParaRPr lang="de-DE" dirty="0"/>
+          </a:p>
+        </p:txBody>
+      </p:sp>
+      <p:sp>
+        <p:nvSpPr>
+          <p:cNvPr id="3" name="Inhaltsplatzhalter 2"/>
+          <p:cNvSpPr>
+            <a:spLocks noGrp="1"/>
+          </p:cNvSpPr>
+          <p:nvPr>
+            <p:ph idx="1"/>
+          </p:nvPr>
+        </p:nvSpPr>
+        <p:spPr>
+          <a:xfrm>
+            <a:off x="611188" y="1628800"/>
+            <a:ext cx="7848600" cy="4175125"/>
+          </a:xfrm>
+        </p:spPr>
+        <p:txBody>
+          <a:bodyPr/>
+          <a:lstStyle/>
+          <a:p>
+            <a:r>
+              <a:rPr lang="de-DE" dirty="0" smtClean="0"/>
+              <a:t>Implementierung stimmt mit eigentlichem Plan lückenlos überein!</a:t>
             </a:r>
             <a:endParaRPr lang="de-DE" dirty="0"/>
           </a:p>
@@ -4831,79 +4718,44 @@
       </p:sp>
       <p:pic>
         <p:nvPicPr>
-          <p:cNvPr id="10" name="Grafik 9"/>
+          <p:cNvPr id="6" name="Bild 8"/>
           <p:cNvPicPr>
             <a:picLocks noChangeAspect="1"/>
           </p:cNvPicPr>
           <p:nvPr/>
         </p:nvPicPr>
         <p:blipFill>
-          <a:blip r:embed="rId2"/>
+          <a:blip r:embed="rId2" cstate="print">
+            <a:extLst>
+              <a:ext uri="{28A0092B-C50C-407E-A947-70E740481C1C}">
+                <a14:useLocalDpi xmlns:a14="http://schemas.microsoft.com/office/drawing/2010/main" val="0"/>
+              </a:ext>
+            </a:extLst>
+          </a:blip>
           <a:stretch>
             <a:fillRect/>
           </a:stretch>
         </p:blipFill>
         <p:spPr>
           <a:xfrm>
-            <a:off x="611560" y="1700808"/>
-            <a:ext cx="4695825" cy="1714500"/>
+            <a:off x="-61300" y="2199506"/>
+            <a:ext cx="11425599" cy="8075564"/>
           </a:xfrm>
           <a:prstGeom prst="rect">
             <a:avLst/>
           </a:prstGeom>
-          <a:ln>
-            <a:solidFill>
-              <a:schemeClr val="tx1"/>
-            </a:solidFill>
-          </a:ln>
-        </p:spPr>
-      </p:pic>
-      <p:pic>
-        <p:nvPicPr>
-          <p:cNvPr id="13" name="Grafik 12"/>
-          <p:cNvPicPr>
-            <a:picLocks noChangeAspect="1"/>
-          </p:cNvPicPr>
-          <p:nvPr/>
-        </p:nvPicPr>
-        <p:blipFill>
-          <a:blip r:embed="rId3"/>
-          <a:stretch>
-            <a:fillRect/>
-          </a:stretch>
-        </p:blipFill>
-        <p:spPr>
-          <a:xfrm>
-            <a:off x="628359" y="3602047"/>
-            <a:ext cx="4679026" cy="2495550"/>
-          </a:xfrm>
-          <a:prstGeom prst="rect">
-            <a:avLst/>
-          </a:prstGeom>
-          <a:ln>
-            <a:solidFill>
-              <a:schemeClr val="tx1"/>
-            </a:solidFill>
-          </a:ln>
         </p:spPr>
       </p:pic>
     </p:spTree>
     <p:extLst>
       <p:ext uri="{BB962C8B-B14F-4D97-AF65-F5344CB8AC3E}">
-        <p14:creationId xmlns:p14="http://schemas.microsoft.com/office/powerpoint/2010/main" val="2362971557"/>
+        <p14:creationId xmlns:p14="http://schemas.microsoft.com/office/powerpoint/2010/main" val="3316733860"/>
       </p:ext>
     </p:extLst>
   </p:cSld>
   <p:clrMapOvr>
     <a:masterClrMapping/>
   </p:clrMapOvr>
-  <p:timing>
-    <p:tnLst>
-      <p:par>
-        <p:cTn id="1" dur="indefinite" restart="never" nodeType="tmRoot"/>
-      </p:par>
-    </p:tnLst>
-  </p:timing>
 </p:sld>
 </file>
 

</xml_diff>